<commit_message>
probably good for now
</commit_message>
<xml_diff>
--- a/figures/overview.pptx
+++ b/figures/overview.pptx
@@ -2,12 +2,12 @@
 <file path=ppt/presentation.xml><?xml version="1.0" encoding="utf-8"?>
 <p:presentation xmlns:a="http://schemas.openxmlformats.org/drawingml/2006/main" xmlns:r="http://schemas.openxmlformats.org/officeDocument/2006/relationships" xmlns:p="http://schemas.openxmlformats.org/presentationml/2006/main" saveSubsetFonts="1" autoCompressPictures="0">
   <p:sldMasterIdLst>
-    <p:sldMasterId id="2147483648" r:id="rId1"/>
+    <p:sldMasterId id="2147483660" r:id="rId1"/>
   </p:sldMasterIdLst>
   <p:sldIdLst>
     <p:sldId id="256" r:id="rId2"/>
   </p:sldIdLst>
-  <p:sldSz cx="12192000" cy="6858000"/>
+  <p:sldSz cx="9144000" cy="6858000" type="screen4x3"/>
   <p:notesSz cx="6858000" cy="9144000"/>
   <p:defaultTextStyle>
     <a:defPPr>
@@ -946,12 +946,35 @@
             </a:lnSpc>
           </a:pPr>
           <a:r>
+            <a:rPr lang="en-US" sz="2000" i="1" dirty="0" smtClean="0">
+              <a:latin typeface="Arial" charset="0"/>
+              <a:ea typeface="Arial" charset="0"/>
+              <a:cs typeface="Arial" charset="0"/>
+            </a:rPr>
+            <a:t>Proportion Pathogens Shared </a:t>
+          </a:r>
+          <a:r>
             <a:rPr lang="en-US" sz="2000" dirty="0" smtClean="0">
               <a:latin typeface="Arial" charset="0"/>
               <a:ea typeface="Arial" charset="0"/>
               <a:cs typeface="Arial" charset="0"/>
             </a:rPr>
-            <a:t>Pathogens Shared = β</a:t>
+            <a:t>= </a:t>
+          </a:r>
+        </a:p>
+        <a:p>
+          <a:pPr>
+            <a:lnSpc>
+              <a:spcPct val="150000"/>
+            </a:lnSpc>
+          </a:pPr>
+          <a:r>
+            <a:rPr lang="el-GR" sz="2000" dirty="0" smtClean="0">
+              <a:latin typeface="Arial" charset="0"/>
+              <a:ea typeface="Arial" charset="0"/>
+              <a:cs typeface="Arial" charset="0"/>
+            </a:rPr>
+            <a:t>Β</a:t>
           </a:r>
           <a:r>
             <a:rPr lang="en-US" sz="2000" baseline="-25000" dirty="0" smtClean="0">
@@ -959,7 +982,7 @@
               <a:ea typeface="Arial" charset="0"/>
               <a:cs typeface="Arial" charset="0"/>
             </a:rPr>
-            <a:t>1*</a:t>
+            <a:t>1 *</a:t>
           </a:r>
           <a:r>
             <a:rPr lang="en-US" sz="2000" dirty="0" smtClean="0">
@@ -967,7 +990,38 @@
               <a:ea typeface="Arial" charset="0"/>
               <a:cs typeface="Arial" charset="0"/>
             </a:rPr>
-            <a:t> Phylogenetic Distance + β</a:t>
+            <a:t> </a:t>
+          </a:r>
+          <a:r>
+            <a:rPr lang="en-US" sz="2000" i="1" dirty="0" smtClean="0">
+              <a:latin typeface="Arial" charset="0"/>
+              <a:ea typeface="Arial" charset="0"/>
+              <a:cs typeface="Arial" charset="0"/>
+            </a:rPr>
+            <a:t>Phylogenetic Distance </a:t>
+          </a:r>
+          <a:r>
+            <a:rPr lang="en-US" sz="2000" dirty="0" smtClean="0">
+              <a:latin typeface="Arial" charset="0"/>
+              <a:ea typeface="Arial" charset="0"/>
+              <a:cs typeface="Arial" charset="0"/>
+            </a:rPr>
+            <a:t>+ </a:t>
+          </a:r>
+        </a:p>
+        <a:p>
+          <a:pPr>
+            <a:lnSpc>
+              <a:spcPct val="150000"/>
+            </a:lnSpc>
+          </a:pPr>
+          <a:r>
+            <a:rPr lang="el-GR" sz="2000" dirty="0" smtClean="0">
+              <a:latin typeface="Arial" charset="0"/>
+              <a:ea typeface="Arial" charset="0"/>
+              <a:cs typeface="Arial" charset="0"/>
+            </a:rPr>
+            <a:t>Β</a:t>
           </a:r>
           <a:r>
             <a:rPr lang="en-US" sz="2000" baseline="-25000" dirty="0" smtClean="0">
@@ -975,10 +1029,10 @@
               <a:ea typeface="Arial" charset="0"/>
               <a:cs typeface="Arial" charset="0"/>
             </a:rPr>
-            <a:t>2* </a:t>
+            <a:t>2 * </a:t>
           </a:r>
           <a:r>
-            <a:rPr lang="en-US" sz="2000" dirty="0" smtClean="0">
+            <a:rPr lang="en-US" sz="2000" i="1" dirty="0" smtClean="0">
               <a:latin typeface="Arial" charset="0"/>
               <a:ea typeface="Arial" charset="0"/>
               <a:cs typeface="Arial" charset="0"/>
@@ -1268,7 +1322,7 @@
               <a:ea typeface="Arial" charset="0"/>
               <a:cs typeface="Arial" charset="0"/>
             </a:rPr>
-            <a:t>Count number of citations</a:t>
+            <a:t>Count number of literature citations</a:t>
           </a:r>
           <a:endParaRPr lang="en-US" sz="2000" dirty="0">
             <a:latin typeface="Arial" charset="0"/>
@@ -1347,7 +1401,7 @@
       </dgm:t>
     </dgm:pt>
     <dgm:pt modelId="{5B6382B9-984F-A747-A481-0B9C1586AC48}" type="pres">
-      <dgm:prSet presAssocID="{3792166C-CFA7-6948-8F0B-C3443D3B83BE}" presName="rootText1" presStyleLbl="node0" presStyleIdx="0" presStyleCnt="1" custScaleX="139860" custScaleY="163815" custLinFactNeighborY="4309">
+      <dgm:prSet presAssocID="{3792166C-CFA7-6948-8F0B-C3443D3B83BE}" presName="rootText1" presStyleLbl="node0" presStyleIdx="0" presStyleCnt="1" custScaleX="139860" custScaleY="283147" custLinFactNeighborX="-19661" custLinFactNeighborY="8130">
         <dgm:presLayoutVars>
           <dgm:chPref val="3"/>
         </dgm:presLayoutVars>
@@ -1421,7 +1475,7 @@
       </dgm:t>
     </dgm:pt>
     <dgm:pt modelId="{036A9C0F-03CF-844A-91F3-A95E86BB1E91}" type="pres">
-      <dgm:prSet presAssocID="{DDB394CE-EFDC-8A47-8B2A-6964C57FA368}" presName="rootText" presStyleLbl="node2" presStyleIdx="0" presStyleCnt="4" custScaleX="80739">
+      <dgm:prSet presAssocID="{DDB394CE-EFDC-8A47-8B2A-6964C57FA368}" presName="rootText" presStyleLbl="node2" presStyleIdx="0" presStyleCnt="4" custScaleX="80739" custLinFactNeighborX="-121" custLinFactNeighborY="-90476">
         <dgm:presLayoutVars>
           <dgm:chPref val="3"/>
         </dgm:presLayoutVars>
@@ -1506,7 +1560,7 @@
       </dgm:t>
     </dgm:pt>
     <dgm:pt modelId="{C84931A6-5192-5C42-8D47-F2CDA83595BA}" type="pres">
-      <dgm:prSet presAssocID="{A1BB8975-1660-7749-8A0C-780F4E18E751}" presName="rootText" presStyleLbl="node2" presStyleIdx="1" presStyleCnt="4" custScaleX="80739" custScaleY="99818">
+      <dgm:prSet presAssocID="{A1BB8975-1660-7749-8A0C-780F4E18E751}" presName="rootText" presStyleLbl="node2" presStyleIdx="1" presStyleCnt="4" custScaleX="80739" custScaleY="99818" custLinFactNeighborX="-121" custLinFactNeighborY="-39069">
         <dgm:presLayoutVars>
           <dgm:chPref val="3"/>
         </dgm:presLayoutVars>
@@ -1591,7 +1645,7 @@
       </dgm:t>
     </dgm:pt>
     <dgm:pt modelId="{ED8965BD-2372-C842-A2BB-BB0AF77EC694}" type="pres">
-      <dgm:prSet presAssocID="{CE9521FF-DBE5-0E4D-8033-0673F193244D}" presName="rootText" presStyleLbl="node2" presStyleIdx="2" presStyleCnt="4" custScaleX="80739">
+      <dgm:prSet presAssocID="{CE9521FF-DBE5-0E4D-8033-0673F193244D}" presName="rootText" presStyleLbl="node2" presStyleIdx="2" presStyleCnt="4" custScaleX="80739" custLinFactNeighborX="-121" custLinFactNeighborY="15395">
         <dgm:presLayoutVars>
           <dgm:chPref val="3"/>
         </dgm:presLayoutVars>
@@ -1676,7 +1730,7 @@
       </dgm:t>
     </dgm:pt>
     <dgm:pt modelId="{097F1385-5578-9F4B-B6C3-24EB3834529E}" type="pres">
-      <dgm:prSet presAssocID="{3EFCF2F3-421D-3F44-9355-41219A29EA58}" presName="rootText" presStyleLbl="node2" presStyleIdx="3" presStyleCnt="4" custScaleX="80739">
+      <dgm:prSet presAssocID="{3EFCF2F3-421D-3F44-9355-41219A29EA58}" presName="rootText" presStyleLbl="node2" presStyleIdx="3" presStyleCnt="4" custScaleX="80739" custLinFactNeighborX="-121" custLinFactNeighborY="57576">
         <dgm:presLayoutVars>
           <dgm:chPref val="3"/>
         </dgm:presLayoutVars>
@@ -1772,7 +1826,7 @@
       </dgm:t>
     </dgm:pt>
     <dgm:pt modelId="{CABDB66E-5158-794D-B12F-5B55D0161C00}" type="pres">
-      <dgm:prSet presAssocID="{C662980D-A1EF-0540-9E21-AD7ED8A20FC1}" presName="rootText3" presStyleLbl="asst1" presStyleIdx="0" presStyleCnt="2" custScaleX="80739" custLinFactNeighborX="-6187" custLinFactNeighborY="2955">
+      <dgm:prSet presAssocID="{C662980D-A1EF-0540-9E21-AD7ED8A20FC1}" presName="rootText3" presStyleLbl="asst1" presStyleIdx="0" presStyleCnt="2" custScaleX="80739" custLinFactNeighborX="-6814" custLinFactNeighborY="-69014">
         <dgm:presLayoutVars>
           <dgm:chPref val="3"/>
         </dgm:presLayoutVars>
@@ -1857,7 +1911,7 @@
       </dgm:t>
     </dgm:pt>
     <dgm:pt modelId="{7651A45B-20B7-C14D-B715-3E76A2E67FD6}" type="pres">
-      <dgm:prSet presAssocID="{9F0C8FA6-60D6-F24A-B385-7E7E172A4816}" presName="rootText3" presStyleLbl="asst1" presStyleIdx="1" presStyleCnt="2" custScaleX="80739" custLinFactNeighborX="-6218" custLinFactNeighborY="3649">
+      <dgm:prSet presAssocID="{9F0C8FA6-60D6-F24A-B385-7E7E172A4816}" presName="rootText3" presStyleLbl="asst1" presStyleIdx="1" presStyleCnt="2" custScaleX="80739" custLinFactNeighborX="-6845" custLinFactNeighborY="61225">
         <dgm:presLayoutVars>
           <dgm:chPref val="3"/>
         </dgm:presLayoutVars>
@@ -2011,8 +2065,8 @@
       </dsp:nvSpPr>
       <dsp:spPr>
         <a:xfrm>
-          <a:off x="4940078" y="2753986"/>
-          <a:ext cx="2262386" cy="205511"/>
+          <a:off x="3749528" y="3493559"/>
+          <a:ext cx="1238084" cy="584342"/>
         </a:xfrm>
         <a:custGeom>
           <a:avLst/>
@@ -2023,13 +2077,13 @@
           <a:pathLst>
             <a:path>
               <a:moveTo>
-                <a:pt x="2262386" y="0"/>
+                <a:pt x="1238084" y="0"/>
               </a:moveTo>
               <a:lnTo>
                 <a:pt x="0" y="0"/>
               </a:lnTo>
               <a:lnTo>
-                <a:pt x="0" y="205511"/>
+                <a:pt x="0" y="584342"/>
               </a:lnTo>
             </a:path>
           </a:pathLst>
@@ -2070,8 +2124,8 @@
       </dsp:nvSpPr>
       <dsp:spPr>
         <a:xfrm>
-          <a:off x="4941132" y="2527604"/>
-          <a:ext cx="2261333" cy="226382"/>
+          <a:off x="3750335" y="2718246"/>
+          <a:ext cx="1237277" cy="775312"/>
         </a:xfrm>
         <a:custGeom>
           <a:avLst/>
@@ -2082,10 +2136,10 @@
           <a:pathLst>
             <a:path>
               <a:moveTo>
-                <a:pt x="2261333" y="226382"/>
+                <a:pt x="1237277" y="775312"/>
               </a:moveTo>
               <a:lnTo>
-                <a:pt x="0" y="226382"/>
+                <a:pt x="0" y="775312"/>
               </a:lnTo>
               <a:lnTo>
                 <a:pt x="0" y="0"/>
@@ -2129,8 +2183,8 @@
       </dsp:nvSpPr>
       <dsp:spPr>
         <a:xfrm>
-          <a:off x="2773012" y="2753986"/>
-          <a:ext cx="4429453" cy="2145865"/>
+          <a:off x="2102098" y="3493559"/>
+          <a:ext cx="2885514" cy="2071218"/>
         </a:xfrm>
         <a:custGeom>
           <a:avLst/>
@@ -2141,16 +2195,16 @@
           <a:pathLst>
             <a:path>
               <a:moveTo>
-                <a:pt x="4429453" y="0"/>
+                <a:pt x="2885514" y="0"/>
               </a:moveTo>
               <a:lnTo>
-                <a:pt x="339761" y="0"/>
+                <a:pt x="260356" y="0"/>
               </a:lnTo>
               <a:lnTo>
-                <a:pt x="339761" y="2145865"/>
+                <a:pt x="260356" y="2071218"/>
               </a:lnTo>
               <a:lnTo>
-                <a:pt x="0" y="2145865"/>
+                <a:pt x="0" y="2071218"/>
               </a:lnTo>
             </a:path>
           </a:pathLst>
@@ -2191,8 +2245,8 @@
       </dsp:nvSpPr>
       <dsp:spPr>
         <a:xfrm>
-          <a:off x="2773012" y="2753986"/>
-          <a:ext cx="4429453" cy="684891"/>
+          <a:off x="2102098" y="3493559"/>
+          <a:ext cx="2885514" cy="616733"/>
         </a:xfrm>
         <a:custGeom>
           <a:avLst/>
@@ -2203,16 +2257,16 @@
           <a:pathLst>
             <a:path>
               <a:moveTo>
-                <a:pt x="4429453" y="0"/>
+                <a:pt x="2885514" y="0"/>
               </a:moveTo>
               <a:lnTo>
-                <a:pt x="339761" y="0"/>
+                <a:pt x="260356" y="0"/>
               </a:lnTo>
               <a:lnTo>
-                <a:pt x="339761" y="684891"/>
+                <a:pt x="260356" y="616733"/>
               </a:lnTo>
               <a:lnTo>
-                <a:pt x="0" y="684891"/>
+                <a:pt x="0" y="616733"/>
               </a:lnTo>
             </a:path>
           </a:pathLst>
@@ -2253,8 +2307,8 @@
       </dsp:nvSpPr>
       <dsp:spPr>
         <a:xfrm>
-          <a:off x="2773012" y="1978846"/>
-          <a:ext cx="4429453" cy="775140"/>
+          <a:off x="2102098" y="2558992"/>
+          <a:ext cx="2885514" cy="934566"/>
         </a:xfrm>
         <a:custGeom>
           <a:avLst/>
@@ -2265,13 +2319,13 @@
           <a:pathLst>
             <a:path>
               <a:moveTo>
-                <a:pt x="4429453" y="775140"/>
+                <a:pt x="2885514" y="934566"/>
               </a:moveTo>
               <a:lnTo>
-                <a:pt x="339761" y="775140"/>
+                <a:pt x="260356" y="934566"/>
               </a:lnTo>
               <a:lnTo>
-                <a:pt x="339761" y="0"/>
+                <a:pt x="260356" y="0"/>
               </a:lnTo>
               <a:lnTo>
                 <a:pt x="0" y="0"/>
@@ -2315,8 +2369,8 @@
       </dsp:nvSpPr>
       <dsp:spPr>
         <a:xfrm>
-          <a:off x="2773012" y="518814"/>
-          <a:ext cx="4429453" cy="2235171"/>
+          <a:off x="2102098" y="1031967"/>
+          <a:ext cx="2885514" cy="2461591"/>
         </a:xfrm>
         <a:custGeom>
           <a:avLst/>
@@ -2327,13 +2381,13 @@
           <a:pathLst>
             <a:path>
               <a:moveTo>
-                <a:pt x="4429453" y="2235171"/>
+                <a:pt x="2885514" y="2461591"/>
               </a:moveTo>
               <a:lnTo>
-                <a:pt x="339761" y="2235171"/>
+                <a:pt x="260356" y="2461591"/>
               </a:lnTo>
               <a:lnTo>
-                <a:pt x="339761" y="0"/>
+                <a:pt x="260356" y="0"/>
               </a:lnTo>
               <a:lnTo>
                 <a:pt x="0" y="0"/>
@@ -2377,8 +2431,8 @@
       </dsp:nvSpPr>
       <dsp:spPr>
         <a:xfrm>
-          <a:off x="7202465" y="1905201"/>
-          <a:ext cx="4751904" cy="1697569"/>
+          <a:off x="4987613" y="2369343"/>
+          <a:ext cx="3641341" cy="2248431"/>
         </a:xfrm>
         <a:prstGeom prst="rect">
           <a:avLst/>
@@ -2438,12 +2492,41 @@
             </a:spcAft>
           </a:pPr>
           <a:r>
+            <a:rPr lang="en-US" sz="2000" i="1" kern="1200" dirty="0" smtClean="0">
+              <a:latin typeface="Arial" charset="0"/>
+              <a:ea typeface="Arial" charset="0"/>
+              <a:cs typeface="Arial" charset="0"/>
+            </a:rPr>
+            <a:t>Proportion Pathogens Shared </a:t>
+          </a:r>
+          <a:r>
             <a:rPr lang="en-US" sz="2000" kern="1200" dirty="0" smtClean="0">
               <a:latin typeface="Arial" charset="0"/>
               <a:ea typeface="Arial" charset="0"/>
               <a:cs typeface="Arial" charset="0"/>
             </a:rPr>
-            <a:t>Pathogens Shared = β</a:t>
+            <a:t>= </a:t>
+          </a:r>
+        </a:p>
+        <a:p>
+          <a:pPr lvl="0" algn="ctr" defTabSz="889000">
+            <a:lnSpc>
+              <a:spcPct val="150000"/>
+            </a:lnSpc>
+            <a:spcBef>
+              <a:spcPct val="0"/>
+            </a:spcBef>
+            <a:spcAft>
+              <a:spcPct val="35000"/>
+            </a:spcAft>
+          </a:pPr>
+          <a:r>
+            <a:rPr lang="el-GR" sz="2000" kern="1200" dirty="0" smtClean="0">
+              <a:latin typeface="Arial" charset="0"/>
+              <a:ea typeface="Arial" charset="0"/>
+              <a:cs typeface="Arial" charset="0"/>
+            </a:rPr>
+            <a:t>Β</a:t>
           </a:r>
           <a:r>
             <a:rPr lang="en-US" sz="2000" kern="1200" baseline="-25000" dirty="0" smtClean="0">
@@ -2451,7 +2534,7 @@
               <a:ea typeface="Arial" charset="0"/>
               <a:cs typeface="Arial" charset="0"/>
             </a:rPr>
-            <a:t>1*</a:t>
+            <a:t>1 *</a:t>
           </a:r>
           <a:r>
             <a:rPr lang="en-US" sz="2000" kern="1200" dirty="0" smtClean="0">
@@ -2459,7 +2542,44 @@
               <a:ea typeface="Arial" charset="0"/>
               <a:cs typeface="Arial" charset="0"/>
             </a:rPr>
-            <a:t> Phylogenetic Distance + β</a:t>
+            <a:t> </a:t>
+          </a:r>
+          <a:r>
+            <a:rPr lang="en-US" sz="2000" i="1" kern="1200" dirty="0" smtClean="0">
+              <a:latin typeface="Arial" charset="0"/>
+              <a:ea typeface="Arial" charset="0"/>
+              <a:cs typeface="Arial" charset="0"/>
+            </a:rPr>
+            <a:t>Phylogenetic Distance </a:t>
+          </a:r>
+          <a:r>
+            <a:rPr lang="en-US" sz="2000" kern="1200" dirty="0" smtClean="0">
+              <a:latin typeface="Arial" charset="0"/>
+              <a:ea typeface="Arial" charset="0"/>
+              <a:cs typeface="Arial" charset="0"/>
+            </a:rPr>
+            <a:t>+ </a:t>
+          </a:r>
+        </a:p>
+        <a:p>
+          <a:pPr lvl="0" algn="ctr" defTabSz="889000">
+            <a:lnSpc>
+              <a:spcPct val="150000"/>
+            </a:lnSpc>
+            <a:spcBef>
+              <a:spcPct val="0"/>
+            </a:spcBef>
+            <a:spcAft>
+              <a:spcPct val="35000"/>
+            </a:spcAft>
+          </a:pPr>
+          <a:r>
+            <a:rPr lang="el-GR" sz="2000" kern="1200" dirty="0" smtClean="0">
+              <a:latin typeface="Arial" charset="0"/>
+              <a:ea typeface="Arial" charset="0"/>
+              <a:cs typeface="Arial" charset="0"/>
+            </a:rPr>
+            <a:t>Β</a:t>
           </a:r>
           <a:r>
             <a:rPr lang="en-US" sz="2000" kern="1200" baseline="-25000" dirty="0" smtClean="0">
@@ -2467,10 +2587,10 @@
               <a:ea typeface="Arial" charset="0"/>
               <a:cs typeface="Arial" charset="0"/>
             </a:rPr>
-            <a:t>2* </a:t>
+            <a:t>2 * </a:t>
           </a:r>
           <a:r>
-            <a:rPr lang="en-US" sz="2000" kern="1200" dirty="0" smtClean="0">
+            <a:rPr lang="en-US" sz="2000" i="1" kern="1200" dirty="0" smtClean="0">
               <a:latin typeface="Arial" charset="0"/>
               <a:ea typeface="Arial" charset="0"/>
               <a:cs typeface="Arial" charset="0"/>
@@ -2506,8 +2626,8 @@
         </a:p>
       </dsp:txBody>
       <dsp:txXfrm>
-        <a:off x="7202465" y="1905201"/>
-        <a:ext cx="4751904" cy="1697569"/>
+        <a:off x="4987613" y="2369343"/>
+        <a:ext cx="3641341" cy="2248431"/>
       </dsp:txXfrm>
     </dsp:sp>
     <dsp:sp modelId="{036A9C0F-03CF-844A-91F3-A95E86BB1E91}">
@@ -2517,8 +2637,8 @@
       </dsp:nvSpPr>
       <dsp:spPr>
         <a:xfrm>
-          <a:off x="29811" y="678"/>
-          <a:ext cx="2743200" cy="1036272"/>
+          <a:off x="8" y="634924"/>
+          <a:ext cx="2102089" cy="794086"/>
         </a:xfrm>
         <a:prstGeom prst="rect">
           <a:avLst/>
@@ -2593,8 +2713,8 @@
         </a:p>
       </dsp:txBody>
       <dsp:txXfrm>
-        <a:off x="29811" y="678"/>
-        <a:ext cx="2743200" cy="1036272"/>
+        <a:off x="8" y="634924"/>
+        <a:ext cx="2102089" cy="794086"/>
       </dsp:txXfrm>
     </dsp:sp>
     <dsp:sp modelId="{C84931A6-5192-5C42-8D47-F2CDA83595BA}">
@@ -2604,8 +2724,8 @@
       </dsp:nvSpPr>
       <dsp:spPr>
         <a:xfrm>
-          <a:off x="29811" y="1461652"/>
-          <a:ext cx="2743200" cy="1034386"/>
+          <a:off x="8" y="2162671"/>
+          <a:ext cx="2102089" cy="792641"/>
         </a:xfrm>
         <a:prstGeom prst="rect">
           <a:avLst/>
@@ -2680,8 +2800,8 @@
         </a:p>
       </dsp:txBody>
       <dsp:txXfrm>
-        <a:off x="29811" y="1461652"/>
-        <a:ext cx="2743200" cy="1034386"/>
+        <a:off x="8" y="2162671"/>
+        <a:ext cx="2102089" cy="792641"/>
       </dsp:txXfrm>
     </dsp:sp>
     <dsp:sp modelId="{ED8965BD-2372-C842-A2BB-BB0AF77EC694}">
@@ -2691,8 +2811,8 @@
       </dsp:nvSpPr>
       <dsp:spPr>
         <a:xfrm>
-          <a:off x="29811" y="2920741"/>
-          <a:ext cx="2743200" cy="1036272"/>
+          <a:off x="8" y="3713249"/>
+          <a:ext cx="2102089" cy="794086"/>
         </a:xfrm>
         <a:prstGeom prst="rect">
           <a:avLst/>
@@ -2767,8 +2887,8 @@
         </a:p>
       </dsp:txBody>
       <dsp:txXfrm>
-        <a:off x="29811" y="2920741"/>
-        <a:ext cx="2743200" cy="1036272"/>
+        <a:off x="8" y="3713249"/>
+        <a:ext cx="2102089" cy="794086"/>
       </dsp:txXfrm>
     </dsp:sp>
     <dsp:sp modelId="{097F1385-5578-9F4B-B6C3-24EB3834529E}">
@@ -2778,8 +2898,8 @@
       </dsp:nvSpPr>
       <dsp:spPr>
         <a:xfrm>
-          <a:off x="29811" y="4381715"/>
-          <a:ext cx="2743200" cy="1036272"/>
+          <a:off x="8" y="5167734"/>
+          <a:ext cx="2102089" cy="794086"/>
         </a:xfrm>
         <a:prstGeom prst="rect">
           <a:avLst/>
@@ -2854,8 +2974,8 @@
         </a:p>
       </dsp:txBody>
       <dsp:txXfrm>
-        <a:off x="29811" y="4381715"/>
-        <a:ext cx="2743200" cy="1036272"/>
+        <a:off x="8" y="5167734"/>
+        <a:ext cx="2102089" cy="794086"/>
       </dsp:txXfrm>
     </dsp:sp>
     <dsp:sp modelId="{CABDB66E-5158-794D-B12F-5B55D0161C00}">
@@ -2865,8 +2985,8 @@
       </dsp:nvSpPr>
       <dsp:spPr>
         <a:xfrm>
-          <a:off x="3569531" y="1491331"/>
-          <a:ext cx="2743200" cy="1036272"/>
+          <a:off x="2699290" y="1924160"/>
+          <a:ext cx="2102089" cy="794086"/>
         </a:xfrm>
         <a:prstGeom prst="rect">
           <a:avLst/>
@@ -2941,8 +3061,8 @@
         </a:p>
       </dsp:txBody>
       <dsp:txXfrm>
-        <a:off x="3569531" y="1491331"/>
-        <a:ext cx="2743200" cy="1036272"/>
+        <a:off x="2699290" y="1924160"/>
+        <a:ext cx="2102089" cy="794086"/>
       </dsp:txXfrm>
     </dsp:sp>
     <dsp:sp modelId="{7651A45B-20B7-C14D-B715-3E76A2E67FD6}">
@@ -2952,8 +3072,8 @@
       </dsp:nvSpPr>
       <dsp:spPr>
         <a:xfrm>
-          <a:off x="3568478" y="2959498"/>
-          <a:ext cx="2743200" cy="1036272"/>
+          <a:off x="2698483" y="4077902"/>
+          <a:ext cx="2102089" cy="794086"/>
         </a:xfrm>
         <a:prstGeom prst="rect">
           <a:avLst/>
@@ -3018,7 +3138,7 @@
               <a:ea typeface="Arial" charset="0"/>
               <a:cs typeface="Arial" charset="0"/>
             </a:rPr>
-            <a:t>Count number of citations</a:t>
+            <a:t>Count number of literature citations</a:t>
           </a:r>
           <a:endParaRPr lang="en-US" sz="2000" kern="1200" dirty="0">
             <a:latin typeface="Arial" charset="0"/>
@@ -3028,8 +3148,8 @@
         </a:p>
       </dsp:txBody>
       <dsp:txXfrm>
-        <a:off x="3568478" y="2959498"/>
-        <a:ext cx="2743200" cy="1036272"/>
+        <a:off x="2698483" y="4077902"/>
+        <a:ext cx="2102089" cy="794086"/>
       </dsp:txXfrm>
     </dsp:sp>
   </dsp:spTree>
@@ -5283,8 +5403,8 @@
         </p:nvSpPr>
         <p:spPr>
           <a:xfrm>
-            <a:off x="1524000" y="1122363"/>
-            <a:ext cx="9144000" cy="2387600"/>
+            <a:off x="685800" y="1122363"/>
+            <a:ext cx="7772400" cy="2387600"/>
           </a:xfrm>
         </p:spPr>
         <p:txBody>
@@ -5299,7 +5419,7 @@
               <a:rPr lang="en-US" smtClean="0"/>
               <a:t>Click to edit Master title style</a:t>
             </a:r>
-            <a:endParaRPr lang="en-US"/>
+            <a:endParaRPr lang="en-US" dirty="0"/>
           </a:p>
         </p:txBody>
       </p:sp>
@@ -5315,8 +5435,8 @@
         </p:nvSpPr>
         <p:spPr>
           <a:xfrm>
-            <a:off x="1524000" y="3602038"/>
-            <a:ext cx="9144000" cy="1655762"/>
+            <a:off x="1143000" y="3602038"/>
+            <a:ext cx="6858000" cy="1655762"/>
           </a:xfrm>
         </p:spPr>
         <p:txBody>
@@ -5364,7 +5484,7 @@
               <a:rPr lang="en-US" smtClean="0"/>
               <a:t>Click to edit Master subtitle style</a:t>
             </a:r>
-            <a:endParaRPr lang="en-US"/>
+            <a:endParaRPr lang="en-US" dirty="0"/>
           </a:p>
         </p:txBody>
       </p:sp>
@@ -5385,7 +5505,7 @@
           <a:p>
             <a:fld id="{924AC9C4-ABDC-D444-A777-7C3005C7EEB7}" type="datetimeFigureOut">
               <a:rPr lang="en-US" smtClean="0"/>
-              <a:t>5/4/21</a:t>
+              <a:t>5/6/21</a:t>
             </a:fld>
             <a:endParaRPr lang="en-US"/>
           </a:p>
@@ -5434,11 +5554,6 @@
         </p:txBody>
       </p:sp>
     </p:spTree>
-    <p:extLst>
-      <p:ext uri="{BB962C8B-B14F-4D97-AF65-F5344CB8AC3E}">
-        <p14:creationId xmlns:p14="http://schemas.microsoft.com/office/powerpoint/2010/main" val="1329630269"/>
-      </p:ext>
-    </p:extLst>
   </p:cSld>
   <p:clrMapOvr>
     <a:masterClrMapping/>
@@ -5482,7 +5597,7 @@
               <a:rPr lang="en-US" smtClean="0"/>
               <a:t>Click to edit Master title style</a:t>
             </a:r>
-            <a:endParaRPr lang="en-US"/>
+            <a:endParaRPr lang="en-US" dirty="0"/>
           </a:p>
         </p:txBody>
       </p:sp>
@@ -5534,7 +5649,7 @@
               <a:rPr lang="en-US" smtClean="0"/>
               <a:t>Fifth level</a:t>
             </a:r>
-            <a:endParaRPr lang="en-US"/>
+            <a:endParaRPr lang="en-US" dirty="0"/>
           </a:p>
         </p:txBody>
       </p:sp>
@@ -5555,7 +5670,7 @@
           <a:p>
             <a:fld id="{924AC9C4-ABDC-D444-A777-7C3005C7EEB7}" type="datetimeFigureOut">
               <a:rPr lang="en-US" smtClean="0"/>
-              <a:t>5/4/21</a:t>
+              <a:t>5/6/21</a:t>
             </a:fld>
             <a:endParaRPr lang="en-US"/>
           </a:p>
@@ -5604,11 +5719,6 @@
         </p:txBody>
       </p:sp>
     </p:spTree>
-    <p:extLst>
-      <p:ext uri="{BB962C8B-B14F-4D97-AF65-F5344CB8AC3E}">
-        <p14:creationId xmlns:p14="http://schemas.microsoft.com/office/powerpoint/2010/main" val="1767954173"/>
-      </p:ext>
-    </p:extLst>
   </p:cSld>
   <p:clrMapOvr>
     <a:masterClrMapping/>
@@ -5645,8 +5755,8 @@
         </p:nvSpPr>
         <p:spPr>
           <a:xfrm>
-            <a:off x="8724900" y="365125"/>
-            <a:ext cx="2628900" cy="5811838"/>
+            <a:off x="6543675" y="365125"/>
+            <a:ext cx="1971675" cy="5811838"/>
           </a:xfrm>
         </p:spPr>
         <p:txBody>
@@ -5657,7 +5767,7 @@
               <a:rPr lang="en-US" smtClean="0"/>
               <a:t>Click to edit Master title style</a:t>
             </a:r>
-            <a:endParaRPr lang="en-US"/>
+            <a:endParaRPr lang="en-US" dirty="0"/>
           </a:p>
         </p:txBody>
       </p:sp>
@@ -5673,8 +5783,8 @@
         </p:nvSpPr>
         <p:spPr>
           <a:xfrm>
-            <a:off x="838200" y="365125"/>
-            <a:ext cx="7734300" cy="5811838"/>
+            <a:off x="628650" y="365125"/>
+            <a:ext cx="5800725" cy="5811838"/>
           </a:xfrm>
         </p:spPr>
         <p:txBody>
@@ -5714,7 +5824,7 @@
               <a:rPr lang="en-US" smtClean="0"/>
               <a:t>Fifth level</a:t>
             </a:r>
-            <a:endParaRPr lang="en-US"/>
+            <a:endParaRPr lang="en-US" dirty="0"/>
           </a:p>
         </p:txBody>
       </p:sp>
@@ -5735,7 +5845,7 @@
           <a:p>
             <a:fld id="{924AC9C4-ABDC-D444-A777-7C3005C7EEB7}" type="datetimeFigureOut">
               <a:rPr lang="en-US" smtClean="0"/>
-              <a:t>5/4/21</a:t>
+              <a:t>5/6/21</a:t>
             </a:fld>
             <a:endParaRPr lang="en-US"/>
           </a:p>
@@ -5784,11 +5894,6 @@
         </p:txBody>
       </p:sp>
     </p:spTree>
-    <p:extLst>
-      <p:ext uri="{BB962C8B-B14F-4D97-AF65-F5344CB8AC3E}">
-        <p14:creationId xmlns:p14="http://schemas.microsoft.com/office/powerpoint/2010/main" val="1422045719"/>
-      </p:ext>
-    </p:extLst>
   </p:cSld>
   <p:clrMapOvr>
     <a:masterClrMapping/>
@@ -5832,7 +5937,7 @@
               <a:rPr lang="en-US" smtClean="0"/>
               <a:t>Click to edit Master title style</a:t>
             </a:r>
-            <a:endParaRPr lang="en-US"/>
+            <a:endParaRPr lang="en-US" dirty="0"/>
           </a:p>
         </p:txBody>
       </p:sp>
@@ -5884,7 +5989,7 @@
               <a:rPr lang="en-US" smtClean="0"/>
               <a:t>Fifth level</a:t>
             </a:r>
-            <a:endParaRPr lang="en-US"/>
+            <a:endParaRPr lang="en-US" dirty="0"/>
           </a:p>
         </p:txBody>
       </p:sp>
@@ -5905,7 +6010,7 @@
           <a:p>
             <a:fld id="{924AC9C4-ABDC-D444-A777-7C3005C7EEB7}" type="datetimeFigureOut">
               <a:rPr lang="en-US" smtClean="0"/>
-              <a:t>5/4/21</a:t>
+              <a:t>5/6/21</a:t>
             </a:fld>
             <a:endParaRPr lang="en-US"/>
           </a:p>
@@ -5954,11 +6059,6 @@
         </p:txBody>
       </p:sp>
     </p:spTree>
-    <p:extLst>
-      <p:ext uri="{BB962C8B-B14F-4D97-AF65-F5344CB8AC3E}">
-        <p14:creationId xmlns:p14="http://schemas.microsoft.com/office/powerpoint/2010/main" val="381100401"/>
-      </p:ext>
-    </p:extLst>
   </p:cSld>
   <p:clrMapOvr>
     <a:masterClrMapping/>
@@ -5995,8 +6095,8 @@
         </p:nvSpPr>
         <p:spPr>
           <a:xfrm>
-            <a:off x="831850" y="1709738"/>
-            <a:ext cx="10515600" cy="2852737"/>
+            <a:off x="623888" y="1709739"/>
+            <a:ext cx="7886700" cy="2852737"/>
           </a:xfrm>
         </p:spPr>
         <p:txBody>
@@ -6011,7 +6111,7 @@
               <a:rPr lang="en-US" smtClean="0"/>
               <a:t>Click to edit Master title style</a:t>
             </a:r>
-            <a:endParaRPr lang="en-US"/>
+            <a:endParaRPr lang="en-US" dirty="0"/>
           </a:p>
         </p:txBody>
       </p:sp>
@@ -6027,8 +6127,8 @@
         </p:nvSpPr>
         <p:spPr>
           <a:xfrm>
-            <a:off x="831850" y="4589463"/>
-            <a:ext cx="10515600" cy="1500187"/>
+            <a:off x="623888" y="4589464"/>
+            <a:ext cx="7886700" cy="1500187"/>
           </a:xfrm>
         </p:spPr>
         <p:txBody>
@@ -6038,9 +6138,7 @@
               <a:buNone/>
               <a:defRPr sz="2400">
                 <a:solidFill>
-                  <a:schemeClr val="tx1">
-                    <a:tint val="75000"/>
-                  </a:schemeClr>
+                  <a:schemeClr val="tx1"/>
                 </a:solidFill>
               </a:defRPr>
             </a:lvl1pPr>
@@ -6151,7 +6249,7 @@
           <a:p>
             <a:fld id="{924AC9C4-ABDC-D444-A777-7C3005C7EEB7}" type="datetimeFigureOut">
               <a:rPr lang="en-US" smtClean="0"/>
-              <a:t>5/4/21</a:t>
+              <a:t>5/6/21</a:t>
             </a:fld>
             <a:endParaRPr lang="en-US"/>
           </a:p>
@@ -6200,11 +6298,6 @@
         </p:txBody>
       </p:sp>
     </p:spTree>
-    <p:extLst>
-      <p:ext uri="{BB962C8B-B14F-4D97-AF65-F5344CB8AC3E}">
-        <p14:creationId xmlns:p14="http://schemas.microsoft.com/office/powerpoint/2010/main" val="1358204253"/>
-      </p:ext>
-    </p:extLst>
   </p:cSld>
   <p:clrMapOvr>
     <a:masterClrMapping/>
@@ -6248,7 +6341,7 @@
               <a:rPr lang="en-US" smtClean="0"/>
               <a:t>Click to edit Master title style</a:t>
             </a:r>
-            <a:endParaRPr lang="en-US"/>
+            <a:endParaRPr lang="en-US" dirty="0"/>
           </a:p>
         </p:txBody>
       </p:sp>
@@ -6264,8 +6357,8 @@
         </p:nvSpPr>
         <p:spPr>
           <a:xfrm>
-            <a:off x="838200" y="1825625"/>
-            <a:ext cx="5181600" cy="4351338"/>
+            <a:off x="628650" y="1825625"/>
+            <a:ext cx="3886200" cy="4351338"/>
           </a:xfrm>
         </p:spPr>
         <p:txBody>
@@ -6305,7 +6398,7 @@
               <a:rPr lang="en-US" smtClean="0"/>
               <a:t>Fifth level</a:t>
             </a:r>
-            <a:endParaRPr lang="en-US"/>
+            <a:endParaRPr lang="en-US" dirty="0"/>
           </a:p>
         </p:txBody>
       </p:sp>
@@ -6321,8 +6414,8 @@
         </p:nvSpPr>
         <p:spPr>
           <a:xfrm>
-            <a:off x="6172200" y="1825625"/>
-            <a:ext cx="5181600" cy="4351338"/>
+            <a:off x="4629150" y="1825625"/>
+            <a:ext cx="3886200" cy="4351338"/>
           </a:xfrm>
         </p:spPr>
         <p:txBody>
@@ -6362,7 +6455,7 @@
               <a:rPr lang="en-US" smtClean="0"/>
               <a:t>Fifth level</a:t>
             </a:r>
-            <a:endParaRPr lang="en-US"/>
+            <a:endParaRPr lang="en-US" dirty="0"/>
           </a:p>
         </p:txBody>
       </p:sp>
@@ -6383,7 +6476,7 @@
           <a:p>
             <a:fld id="{924AC9C4-ABDC-D444-A777-7C3005C7EEB7}" type="datetimeFigureOut">
               <a:rPr lang="en-US" smtClean="0"/>
-              <a:t>5/4/21</a:t>
+              <a:t>5/6/21</a:t>
             </a:fld>
             <a:endParaRPr lang="en-US"/>
           </a:p>
@@ -6432,11 +6525,6 @@
         </p:txBody>
       </p:sp>
     </p:spTree>
-    <p:extLst>
-      <p:ext uri="{BB962C8B-B14F-4D97-AF65-F5344CB8AC3E}">
-        <p14:creationId xmlns:p14="http://schemas.microsoft.com/office/powerpoint/2010/main" val="1735196208"/>
-      </p:ext>
-    </p:extLst>
   </p:cSld>
   <p:clrMapOvr>
     <a:masterClrMapping/>
@@ -6473,8 +6561,8 @@
         </p:nvSpPr>
         <p:spPr>
           <a:xfrm>
-            <a:off x="839788" y="365125"/>
-            <a:ext cx="10515600" cy="1325563"/>
+            <a:off x="629841" y="365126"/>
+            <a:ext cx="7886700" cy="1325563"/>
           </a:xfrm>
         </p:spPr>
         <p:txBody>
@@ -6485,7 +6573,7 @@
               <a:rPr lang="en-US" smtClean="0"/>
               <a:t>Click to edit Master title style</a:t>
             </a:r>
-            <a:endParaRPr lang="en-US"/>
+            <a:endParaRPr lang="en-US" dirty="0"/>
           </a:p>
         </p:txBody>
       </p:sp>
@@ -6501,8 +6589,8 @@
         </p:nvSpPr>
         <p:spPr>
           <a:xfrm>
-            <a:off x="839788" y="1681163"/>
-            <a:ext cx="5157787" cy="823912"/>
+            <a:off x="629842" y="1681163"/>
+            <a:ext cx="3868340" cy="823912"/>
           </a:xfrm>
         </p:spPr>
         <p:txBody>
@@ -6566,8 +6654,8 @@
         </p:nvSpPr>
         <p:spPr>
           <a:xfrm>
-            <a:off x="839788" y="2505075"/>
-            <a:ext cx="5157787" cy="3684588"/>
+            <a:off x="629842" y="2505075"/>
+            <a:ext cx="3868340" cy="3684588"/>
           </a:xfrm>
         </p:spPr>
         <p:txBody>
@@ -6607,7 +6695,7 @@
               <a:rPr lang="en-US" smtClean="0"/>
               <a:t>Fifth level</a:t>
             </a:r>
-            <a:endParaRPr lang="en-US"/>
+            <a:endParaRPr lang="en-US" dirty="0"/>
           </a:p>
         </p:txBody>
       </p:sp>
@@ -6623,8 +6711,8 @@
         </p:nvSpPr>
         <p:spPr>
           <a:xfrm>
-            <a:off x="6172200" y="1681163"/>
-            <a:ext cx="5183188" cy="823912"/>
+            <a:off x="4629150" y="1681163"/>
+            <a:ext cx="3887391" cy="823912"/>
           </a:xfrm>
         </p:spPr>
         <p:txBody>
@@ -6688,8 +6776,8 @@
         </p:nvSpPr>
         <p:spPr>
           <a:xfrm>
-            <a:off x="6172200" y="2505075"/>
-            <a:ext cx="5183188" cy="3684588"/>
+            <a:off x="4629150" y="2505075"/>
+            <a:ext cx="3887391" cy="3684588"/>
           </a:xfrm>
         </p:spPr>
         <p:txBody>
@@ -6729,7 +6817,7 @@
               <a:rPr lang="en-US" smtClean="0"/>
               <a:t>Fifth level</a:t>
             </a:r>
-            <a:endParaRPr lang="en-US"/>
+            <a:endParaRPr lang="en-US" dirty="0"/>
           </a:p>
         </p:txBody>
       </p:sp>
@@ -6750,7 +6838,7 @@
           <a:p>
             <a:fld id="{924AC9C4-ABDC-D444-A777-7C3005C7EEB7}" type="datetimeFigureOut">
               <a:rPr lang="en-US" smtClean="0"/>
-              <a:t>5/4/21</a:t>
+              <a:t>5/6/21</a:t>
             </a:fld>
             <a:endParaRPr lang="en-US"/>
           </a:p>
@@ -6799,11 +6887,6 @@
         </p:txBody>
       </p:sp>
     </p:spTree>
-    <p:extLst>
-      <p:ext uri="{BB962C8B-B14F-4D97-AF65-F5344CB8AC3E}">
-        <p14:creationId xmlns:p14="http://schemas.microsoft.com/office/powerpoint/2010/main" val="614741596"/>
-      </p:ext>
-    </p:extLst>
   </p:cSld>
   <p:clrMapOvr>
     <a:masterClrMapping/>
@@ -6847,7 +6930,7 @@
               <a:rPr lang="en-US" smtClean="0"/>
               <a:t>Click to edit Master title style</a:t>
             </a:r>
-            <a:endParaRPr lang="en-US"/>
+            <a:endParaRPr lang="en-US" dirty="0"/>
           </a:p>
         </p:txBody>
       </p:sp>
@@ -6868,7 +6951,7 @@
           <a:p>
             <a:fld id="{924AC9C4-ABDC-D444-A777-7C3005C7EEB7}" type="datetimeFigureOut">
               <a:rPr lang="en-US" smtClean="0"/>
-              <a:t>5/4/21</a:t>
+              <a:t>5/6/21</a:t>
             </a:fld>
             <a:endParaRPr lang="en-US"/>
           </a:p>
@@ -6917,11 +7000,6 @@
         </p:txBody>
       </p:sp>
     </p:spTree>
-    <p:extLst>
-      <p:ext uri="{BB962C8B-B14F-4D97-AF65-F5344CB8AC3E}">
-        <p14:creationId xmlns:p14="http://schemas.microsoft.com/office/powerpoint/2010/main" val="418178255"/>
-      </p:ext>
-    </p:extLst>
   </p:cSld>
   <p:clrMapOvr>
     <a:masterClrMapping/>
@@ -6963,7 +7041,7 @@
           <a:p>
             <a:fld id="{924AC9C4-ABDC-D444-A777-7C3005C7EEB7}" type="datetimeFigureOut">
               <a:rPr lang="en-US" smtClean="0"/>
-              <a:t>5/4/21</a:t>
+              <a:t>5/6/21</a:t>
             </a:fld>
             <a:endParaRPr lang="en-US"/>
           </a:p>
@@ -7012,11 +7090,6 @@
         </p:txBody>
       </p:sp>
     </p:spTree>
-    <p:extLst>
-      <p:ext uri="{BB962C8B-B14F-4D97-AF65-F5344CB8AC3E}">
-        <p14:creationId xmlns:p14="http://schemas.microsoft.com/office/powerpoint/2010/main" val="1755438801"/>
-      </p:ext>
-    </p:extLst>
   </p:cSld>
   <p:clrMapOvr>
     <a:masterClrMapping/>
@@ -7053,8 +7126,8 @@
         </p:nvSpPr>
         <p:spPr>
           <a:xfrm>
-            <a:off x="839788" y="457200"/>
-            <a:ext cx="3932237" cy="1600200"/>
+            <a:off x="629841" y="457200"/>
+            <a:ext cx="2949178" cy="1600200"/>
           </a:xfrm>
         </p:spPr>
         <p:txBody>
@@ -7069,7 +7142,7 @@
               <a:rPr lang="en-US" smtClean="0"/>
               <a:t>Click to edit Master title style</a:t>
             </a:r>
-            <a:endParaRPr lang="en-US"/>
+            <a:endParaRPr lang="en-US" dirty="0"/>
           </a:p>
         </p:txBody>
       </p:sp>
@@ -7085,8 +7158,8 @@
         </p:nvSpPr>
         <p:spPr>
           <a:xfrm>
-            <a:off x="5183188" y="987425"/>
-            <a:ext cx="6172200" cy="4873625"/>
+            <a:off x="3887391" y="987426"/>
+            <a:ext cx="4629150" cy="4873625"/>
           </a:xfrm>
         </p:spPr>
         <p:txBody>
@@ -7154,7 +7227,7 @@
               <a:rPr lang="en-US" smtClean="0"/>
               <a:t>Fifth level</a:t>
             </a:r>
-            <a:endParaRPr lang="en-US"/>
+            <a:endParaRPr lang="en-US" dirty="0"/>
           </a:p>
         </p:txBody>
       </p:sp>
@@ -7170,8 +7243,8 @@
         </p:nvSpPr>
         <p:spPr>
           <a:xfrm>
-            <a:off x="839788" y="2057400"/>
-            <a:ext cx="3932237" cy="3811588"/>
+            <a:off x="629841" y="2057400"/>
+            <a:ext cx="2949178" cy="3811588"/>
           </a:xfrm>
         </p:spPr>
         <p:txBody>
@@ -7240,7 +7313,7 @@
           <a:p>
             <a:fld id="{924AC9C4-ABDC-D444-A777-7C3005C7EEB7}" type="datetimeFigureOut">
               <a:rPr lang="en-US" smtClean="0"/>
-              <a:t>5/4/21</a:t>
+              <a:t>5/6/21</a:t>
             </a:fld>
             <a:endParaRPr lang="en-US"/>
           </a:p>
@@ -7289,11 +7362,6 @@
         </p:txBody>
       </p:sp>
     </p:spTree>
-    <p:extLst>
-      <p:ext uri="{BB962C8B-B14F-4D97-AF65-F5344CB8AC3E}">
-        <p14:creationId xmlns:p14="http://schemas.microsoft.com/office/powerpoint/2010/main" val="1529585921"/>
-      </p:ext>
-    </p:extLst>
   </p:cSld>
   <p:clrMapOvr>
     <a:masterClrMapping/>
@@ -7330,8 +7398,8 @@
         </p:nvSpPr>
         <p:spPr>
           <a:xfrm>
-            <a:off x="839788" y="457200"/>
-            <a:ext cx="3932237" cy="1600200"/>
+            <a:off x="629841" y="457200"/>
+            <a:ext cx="2949178" cy="1600200"/>
           </a:xfrm>
         </p:spPr>
         <p:txBody>
@@ -7346,7 +7414,7 @@
               <a:rPr lang="en-US" smtClean="0"/>
               <a:t>Click to edit Master title style</a:t>
             </a:r>
-            <a:endParaRPr lang="en-US"/>
+            <a:endParaRPr lang="en-US" dirty="0"/>
           </a:p>
         </p:txBody>
       </p:sp>
@@ -7354,7 +7422,7 @@
         <p:nvSpPr>
           <p:cNvPr id="3" name="Picture Placeholder 2"/>
           <p:cNvSpPr>
-            <a:spLocks noGrp="1"/>
+            <a:spLocks noGrp="1" noChangeAspect="1"/>
           </p:cNvSpPr>
           <p:nvPr>
             <p:ph type="pic" idx="1"/>
@@ -7362,12 +7430,12 @@
         </p:nvSpPr>
         <p:spPr>
           <a:xfrm>
-            <a:off x="5183188" y="987425"/>
-            <a:ext cx="6172200" cy="4873625"/>
+            <a:off x="3887391" y="987426"/>
+            <a:ext cx="4629150" cy="4873625"/>
           </a:xfrm>
         </p:spPr>
         <p:txBody>
-          <a:bodyPr/>
+          <a:bodyPr anchor="t"/>
           <a:lstStyle>
             <a:lvl1pPr marL="0" indent="0">
               <a:buNone/>
@@ -7407,7 +7475,11 @@
             </a:lvl9pPr>
           </a:lstStyle>
           <a:p>
-            <a:endParaRPr lang="en-US"/>
+            <a:r>
+              <a:rPr lang="en-US" smtClean="0"/>
+              <a:t>Drag picture to placeholder or click icon to add</a:t>
+            </a:r>
+            <a:endParaRPr lang="en-US" dirty="0"/>
           </a:p>
         </p:txBody>
       </p:sp>
@@ -7423,8 +7495,8 @@
         </p:nvSpPr>
         <p:spPr>
           <a:xfrm>
-            <a:off x="839788" y="2057400"/>
-            <a:ext cx="3932237" cy="3811588"/>
+            <a:off x="629841" y="2057400"/>
+            <a:ext cx="2949178" cy="3811588"/>
           </a:xfrm>
         </p:spPr>
         <p:txBody>
@@ -7493,7 +7565,7 @@
           <a:p>
             <a:fld id="{924AC9C4-ABDC-D444-A777-7C3005C7EEB7}" type="datetimeFigureOut">
               <a:rPr lang="en-US" smtClean="0"/>
-              <a:t>5/4/21</a:t>
+              <a:t>5/6/21</a:t>
             </a:fld>
             <a:endParaRPr lang="en-US"/>
           </a:p>
@@ -7542,11 +7614,6 @@
         </p:txBody>
       </p:sp>
     </p:spTree>
-    <p:extLst>
-      <p:ext uri="{BB962C8B-B14F-4D97-AF65-F5344CB8AC3E}">
-        <p14:creationId xmlns:p14="http://schemas.microsoft.com/office/powerpoint/2010/main" val="223836010"/>
-      </p:ext>
-    </p:extLst>
   </p:cSld>
   <p:clrMapOvr>
     <a:masterClrMapping/>
@@ -7588,8 +7655,8 @@
         </p:nvSpPr>
         <p:spPr>
           <a:xfrm>
-            <a:off x="838200" y="365125"/>
-            <a:ext cx="10515600" cy="1325563"/>
+            <a:off x="628650" y="365126"/>
+            <a:ext cx="7886700" cy="1325563"/>
           </a:xfrm>
           <a:prstGeom prst="rect">
             <a:avLst/>
@@ -7605,7 +7672,7 @@
               <a:rPr lang="en-US" smtClean="0"/>
               <a:t>Click to edit Master title style</a:t>
             </a:r>
-            <a:endParaRPr lang="en-US"/>
+            <a:endParaRPr lang="en-US" dirty="0"/>
           </a:p>
         </p:txBody>
       </p:sp>
@@ -7621,8 +7688,8 @@
         </p:nvSpPr>
         <p:spPr>
           <a:xfrm>
-            <a:off x="838200" y="1825625"/>
-            <a:ext cx="10515600" cy="4351338"/>
+            <a:off x="628650" y="1825625"/>
+            <a:ext cx="7886700" cy="4351338"/>
           </a:xfrm>
           <a:prstGeom prst="rect">
             <a:avLst/>
@@ -7667,7 +7734,7 @@
               <a:rPr lang="en-US" smtClean="0"/>
               <a:t>Fifth level</a:t>
             </a:r>
-            <a:endParaRPr lang="en-US"/>
+            <a:endParaRPr lang="en-US" dirty="0"/>
           </a:p>
         </p:txBody>
       </p:sp>
@@ -7683,8 +7750,8 @@
         </p:nvSpPr>
         <p:spPr>
           <a:xfrm>
-            <a:off x="838200" y="6356350"/>
-            <a:ext cx="2743200" cy="365125"/>
+            <a:off x="628650" y="6356351"/>
+            <a:ext cx="2057400" cy="365125"/>
           </a:xfrm>
           <a:prstGeom prst="rect">
             <a:avLst/>
@@ -7706,7 +7773,7 @@
           <a:p>
             <a:fld id="{924AC9C4-ABDC-D444-A777-7C3005C7EEB7}" type="datetimeFigureOut">
               <a:rPr lang="en-US" smtClean="0"/>
-              <a:t>5/4/21</a:t>
+              <a:t>5/6/21</a:t>
             </a:fld>
             <a:endParaRPr lang="en-US"/>
           </a:p>
@@ -7724,8 +7791,8 @@
         </p:nvSpPr>
         <p:spPr>
           <a:xfrm>
-            <a:off x="4038600" y="6356350"/>
-            <a:ext cx="4114800" cy="365125"/>
+            <a:off x="3028950" y="6356351"/>
+            <a:ext cx="3086100" cy="365125"/>
           </a:xfrm>
           <a:prstGeom prst="rect">
             <a:avLst/>
@@ -7761,8 +7828,8 @@
         </p:nvSpPr>
         <p:spPr>
           <a:xfrm>
-            <a:off x="8610600" y="6356350"/>
-            <a:ext cx="2743200" cy="365125"/>
+            <a:off x="6457950" y="6356351"/>
+            <a:ext cx="2057400" cy="365125"/>
           </a:xfrm>
           <a:prstGeom prst="rect">
             <a:avLst/>
@@ -7793,23 +7860,23 @@
     </p:spTree>
     <p:extLst>
       <p:ext uri="{BB962C8B-B14F-4D97-AF65-F5344CB8AC3E}">
-        <p14:creationId xmlns:p14="http://schemas.microsoft.com/office/powerpoint/2010/main" val="244892503"/>
+        <p14:creationId xmlns:p14="http://schemas.microsoft.com/office/powerpoint/2010/main" val="2058580079"/>
       </p:ext>
     </p:extLst>
   </p:cSld>
   <p:clrMap bg1="lt1" tx1="dk1" bg2="lt2" tx2="dk2" accent1="accent1" accent2="accent2" accent3="accent3" accent4="accent4" accent5="accent5" accent6="accent6" hlink="hlink" folHlink="folHlink"/>
   <p:sldLayoutIdLst>
-    <p:sldLayoutId id="2147483649" r:id="rId1"/>
-    <p:sldLayoutId id="2147483650" r:id="rId2"/>
-    <p:sldLayoutId id="2147483651" r:id="rId3"/>
-    <p:sldLayoutId id="2147483652" r:id="rId4"/>
-    <p:sldLayoutId id="2147483653" r:id="rId5"/>
-    <p:sldLayoutId id="2147483654" r:id="rId6"/>
-    <p:sldLayoutId id="2147483655" r:id="rId7"/>
-    <p:sldLayoutId id="2147483656" r:id="rId8"/>
-    <p:sldLayoutId id="2147483657" r:id="rId9"/>
-    <p:sldLayoutId id="2147483658" r:id="rId10"/>
-    <p:sldLayoutId id="2147483659" r:id="rId11"/>
+    <p:sldLayoutId id="2147483661" r:id="rId1"/>
+    <p:sldLayoutId id="2147483662" r:id="rId2"/>
+    <p:sldLayoutId id="2147483663" r:id="rId3"/>
+    <p:sldLayoutId id="2147483664" r:id="rId4"/>
+    <p:sldLayoutId id="2147483665" r:id="rId5"/>
+    <p:sldLayoutId id="2147483666" r:id="rId6"/>
+    <p:sldLayoutId id="2147483667" r:id="rId7"/>
+    <p:sldLayoutId id="2147483668" r:id="rId8"/>
+    <p:sldLayoutId id="2147483669" r:id="rId9"/>
+    <p:sldLayoutId id="2147483670" r:id="rId10"/>
+    <p:sldLayoutId id="2147483671" r:id="rId11"/>
   </p:sldLayoutIdLst>
   <p:txStyles>
     <p:titleStyle>
@@ -7839,7 +7906,7 @@
         <a:spcBef>
           <a:spcPts val="1000"/>
         </a:spcBef>
-        <a:buFont typeface="Arial"/>
+        <a:buFont typeface="Arial" panose="020B0604020202020204" pitchFamily="34" charset="0"/>
         <a:buChar char="•"/>
         <a:defRPr sz="2800" kern="1200">
           <a:solidFill>
@@ -7857,7 +7924,7 @@
         <a:spcBef>
           <a:spcPts val="500"/>
         </a:spcBef>
-        <a:buFont typeface="Arial"/>
+        <a:buFont typeface="Arial" panose="020B0604020202020204" pitchFamily="34" charset="0"/>
         <a:buChar char="•"/>
         <a:defRPr sz="2400" kern="1200">
           <a:solidFill>
@@ -7875,7 +7942,7 @@
         <a:spcBef>
           <a:spcPts val="500"/>
         </a:spcBef>
-        <a:buFont typeface="Arial"/>
+        <a:buFont typeface="Arial" panose="020B0604020202020204" pitchFamily="34" charset="0"/>
         <a:buChar char="•"/>
         <a:defRPr sz="2000" kern="1200">
           <a:solidFill>
@@ -7893,7 +7960,7 @@
         <a:spcBef>
           <a:spcPts val="500"/>
         </a:spcBef>
-        <a:buFont typeface="Arial"/>
+        <a:buFont typeface="Arial" panose="020B0604020202020204" pitchFamily="34" charset="0"/>
         <a:buChar char="•"/>
         <a:defRPr sz="1800" kern="1200">
           <a:solidFill>
@@ -7911,7 +7978,7 @@
         <a:spcBef>
           <a:spcPts val="500"/>
         </a:spcBef>
-        <a:buFont typeface="Arial"/>
+        <a:buFont typeface="Arial" panose="020B0604020202020204" pitchFamily="34" charset="0"/>
         <a:buChar char="•"/>
         <a:defRPr sz="1800" kern="1200">
           <a:solidFill>
@@ -7929,7 +7996,7 @@
         <a:spcBef>
           <a:spcPts val="500"/>
         </a:spcBef>
-        <a:buFont typeface="Arial"/>
+        <a:buFont typeface="Arial" panose="020B0604020202020204" pitchFamily="34" charset="0"/>
         <a:buChar char="•"/>
         <a:defRPr sz="1800" kern="1200">
           <a:solidFill>
@@ -7947,7 +8014,7 @@
         <a:spcBef>
           <a:spcPts val="500"/>
         </a:spcBef>
-        <a:buFont typeface="Arial"/>
+        <a:buFont typeface="Arial" panose="020B0604020202020204" pitchFamily="34" charset="0"/>
         <a:buChar char="•"/>
         <a:defRPr sz="1800" kern="1200">
           <a:solidFill>
@@ -7965,7 +8032,7 @@
         <a:spcBef>
           <a:spcPts val="500"/>
         </a:spcBef>
-        <a:buFont typeface="Arial"/>
+        <a:buFont typeface="Arial" panose="020B0604020202020204" pitchFamily="34" charset="0"/>
         <a:buChar char="•"/>
         <a:defRPr sz="1800" kern="1200">
           <a:solidFill>
@@ -7983,7 +8050,7 @@
         <a:spcBef>
           <a:spcPts val="500"/>
         </a:spcBef>
-        <a:buFont typeface="Arial"/>
+        <a:buFont typeface="Arial" panose="020B0604020202020204" pitchFamily="34" charset="0"/>
         <a:buChar char="•"/>
         <a:defRPr sz="1800" kern="1200">
           <a:solidFill>
@@ -8118,14 +8185,14 @@
           <p:nvPr>
             <p:extLst>
               <p:ext uri="{D42A27DB-BD31-4B8C-83A1-F6EECF244321}">
-                <p14:modId xmlns:p14="http://schemas.microsoft.com/office/powerpoint/2010/main" val="833982191"/>
+                <p14:modId xmlns:p14="http://schemas.microsoft.com/office/powerpoint/2010/main" val="303697828"/>
               </p:ext>
             </p:extLst>
           </p:nvPr>
         </p:nvGraphicFramePr>
         <p:xfrm>
-          <a:off x="0" y="626330"/>
-          <a:ext cx="11984182" cy="5418667"/>
+          <a:off x="0" y="0"/>
+          <a:ext cx="9144000" cy="6858000"/>
         </p:xfrm>
         <a:graphic>
           <a:graphicData uri="http://schemas.openxmlformats.org/drawingml/2006/diagram">
@@ -8156,7 +8223,7 @@
 <file path=ppt/theme/theme1.xml><?xml version="1.0" encoding="utf-8"?>
 <a:theme xmlns:a="http://schemas.openxmlformats.org/drawingml/2006/main" name="Office Theme">
   <a:themeElements>
-    <a:clrScheme name="Office">
+    <a:clrScheme name="Office Theme">
       <a:dk1>
         <a:sysClr val="windowText" lastClr="000000"/>
       </a:dk1>
@@ -8194,14 +8261,14 @@
         <a:srgbClr val="954F72"/>
       </a:folHlink>
     </a:clrScheme>
-    <a:fontScheme name="Office">
+    <a:fontScheme name="Office Theme">
       <a:majorFont>
         <a:latin typeface="Calibri Light" panose="020F0302020204030204"/>
         <a:ea typeface=""/>
         <a:cs typeface=""/>
-        <a:font script="Jpan" typeface="Yu Gothic Light"/>
+        <a:font script="Jpan" typeface="游ゴシック Light"/>
         <a:font script="Hang" typeface="맑은 고딕"/>
-        <a:font script="Hans" typeface="DengXian Light"/>
+        <a:font script="Hans" typeface="等线 Light"/>
         <a:font script="Hant" typeface="新細明體"/>
         <a:font script="Arab" typeface="Times New Roman"/>
         <a:font script="Hebr" typeface="Times New Roman"/>
@@ -8234,9 +8301,9 @@
         <a:latin typeface="Calibri" panose="020F0502020204030204"/>
         <a:ea typeface=""/>
         <a:cs typeface=""/>
-        <a:font script="Jpan" typeface="Yu Gothic"/>
+        <a:font script="Jpan" typeface="游ゴシック"/>
         <a:font script="Hang" typeface="맑은 고딕"/>
-        <a:font script="Hans" typeface="DengXian"/>
+        <a:font script="Hans" typeface="等线"/>
         <a:font script="Hant" typeface="新細明體"/>
         <a:font script="Arab" typeface="Arial"/>
         <a:font script="Hebr" typeface="Arial"/>
@@ -8266,7 +8333,7 @@
         <a:font script="Geor" typeface="Sylfaen"/>
       </a:minorFont>
     </a:fontScheme>
-    <a:fmtScheme name="Office">
+    <a:fmtScheme name="Office Theme">
       <a:fillStyleLst>
         <a:solidFill>
           <a:schemeClr val="phClr"/>

</xml_diff>